<commit_message>
MLAdv Open day deploy ML model as API service
</commit_message>
<xml_diff>
--- a/Python/21_NumPy/Presentation/21_Библиотека_Numpy.pptx
+++ b/Python/21_NumPy/Presentation/21_Библиотека_Numpy.pptx
@@ -234,7 +234,7 @@
           <a:p>
             <a:fld id="{929D4DEE-AA18-4B6A-845C-60AFD9463AA2}" type="datetimeFigureOut">
               <a:rPr lang="ru-RU" smtClean="0"/>
-              <a:t>25.06.2024</a:t>
+              <a:t>09.09.2024</a:t>
             </a:fld>
             <a:endParaRPr lang="ru-RU"/>
           </a:p>
@@ -1911,7 +1911,7 @@
           <a:p>
             <a:fld id="{1D8BD707-D9CF-40AE-B4C6-C98DA3205C09}" type="datetimeFigureOut">
               <a:rPr lang="en-US"/>
-              <a:t>6/25/24</a:t>
+              <a:t>9/9/24</a:t>
             </a:fld>
             <a:endParaRPr lang="en-US"/>
           </a:p>
@@ -2086,7 +2086,7 @@
           <a:p>
             <a:fld id="{1D8BD707-D9CF-40AE-B4C6-C98DA3205C09}" type="datetimeFigureOut">
               <a:rPr lang="en-US"/>
-              <a:t>6/25/24</a:t>
+              <a:t>9/9/24</a:t>
             </a:fld>
             <a:endParaRPr lang="en-US"/>
           </a:p>
@@ -2342,7 +2342,7 @@
           <a:p>
             <a:fld id="{1D8BD707-D9CF-40AE-B4C6-C98DA3205C09}" type="datetimeFigureOut">
               <a:rPr lang="en-US"/>
-              <a:t>6/25/24</a:t>
+              <a:t>9/9/24</a:t>
             </a:fld>
             <a:endParaRPr lang="en-US"/>
           </a:p>
@@ -2520,7 +2520,7 @@
           <a:p>
             <a:fld id="{1D8BD707-D9CF-40AE-B4C6-C98DA3205C09}" type="datetimeFigureOut">
               <a:rPr lang="en-US"/>
-              <a:t>6/25/24</a:t>
+              <a:t>9/9/24</a:t>
             </a:fld>
             <a:endParaRPr lang="en-US"/>
           </a:p>
@@ -2639,7 +2639,7 @@
           <a:p>
             <a:fld id="{1D8BD707-D9CF-40AE-B4C6-C98DA3205C09}" type="datetimeFigureOut">
               <a:rPr lang="en-US"/>
-              <a:t>6/25/24</a:t>
+              <a:t>9/9/24</a:t>
             </a:fld>
             <a:endParaRPr lang="en-US"/>
           </a:p>
@@ -5340,7 +5340,7 @@
           <a:p>
             <a:fld id="{1D8BD707-D9CF-40AE-B4C6-C98DA3205C09}" type="datetimeFigureOut">
               <a:rPr lang="en-US"/>
-              <a:t>6/25/24</a:t>
+              <a:t>9/9/24</a:t>
             </a:fld>
             <a:endParaRPr lang="en-US"/>
           </a:p>
@@ -14779,270 +14779,6 @@
       </p:sp>
       <p:sp>
         <p:nvSpPr>
-          <p:cNvPr id="209" name="Google Shape;209;p48"/>
-          <p:cNvSpPr txBox="1">
-            <a:spLocks noGrp="1"/>
-          </p:cNvSpPr>
-          <p:nvPr>
-            <p:ph type="subTitle" idx="3"/>
-          </p:nvPr>
-        </p:nvSpPr>
-        <p:spPr>
-          <a:xfrm>
-            <a:off x="3082400" y="2701811"/>
-            <a:ext cx="5095500" cy="1984839"/>
-          </a:xfrm>
-          <a:prstGeom prst="rect">
-            <a:avLst/>
-          </a:prstGeom>
-        </p:spPr>
-        <p:txBody>
-          <a:bodyPr spcFirstLastPara="1" wrap="square" lIns="91425" tIns="91425" rIns="91425" bIns="91425" anchor="t" anchorCtr="0">
-            <a:normAutofit fontScale="92500" lnSpcReduction="10000"/>
-          </a:bodyPr>
-          <a:lstStyle/>
-          <a:p>
-            <a:pPr marL="0" marR="0" lvl="0" indent="0" algn="l" rtl="0">
-              <a:lnSpc>
-                <a:spcPct val="100000"/>
-              </a:lnSpc>
-              <a:spcBef>
-                <a:spcPts val="0"/>
-              </a:spcBef>
-              <a:spcAft>
-                <a:spcPts val="0"/>
-              </a:spcAft>
-              <a:buNone/>
-            </a:pPr>
-            <a:r>
-              <a:rPr lang="en-US" sz="1150" b="1" dirty="0" err="1"/>
-              <a:t>Teamlead</a:t>
-            </a:r>
-            <a:r>
-              <a:rPr lang="ru-RU" sz="1150" b="1" dirty="0"/>
-              <a:t>, главный инженер проекта –</a:t>
-            </a:r>
-            <a:r>
-              <a:rPr lang="en-US" sz="1150" b="1" dirty="0"/>
-              <a:t> </a:t>
-            </a:r>
-            <a:r>
-              <a:rPr lang="ru-RU" sz="1150" b="1" dirty="0" err="1"/>
-              <a:t>НИИгазэкономика</a:t>
-            </a:r>
-            <a:endParaRPr sz="1150" b="1" dirty="0"/>
-          </a:p>
-          <a:p>
-            <a:pPr marL="0" marR="0" lvl="0" indent="0" algn="l" rtl="0">
-              <a:lnSpc>
-                <a:spcPct val="100000"/>
-              </a:lnSpc>
-              <a:spcBef>
-                <a:spcPts val="0"/>
-              </a:spcBef>
-              <a:spcAft>
-                <a:spcPts val="0"/>
-              </a:spcAft>
-              <a:buNone/>
-            </a:pPr>
-            <a:endParaRPr sz="1150" dirty="0"/>
-          </a:p>
-          <a:p>
-            <a:pPr marL="0" marR="0" lvl="0" indent="0" algn="l" rtl="0">
-              <a:lnSpc>
-                <a:spcPct val="100000"/>
-              </a:lnSpc>
-              <a:spcBef>
-                <a:spcPts val="0"/>
-              </a:spcBef>
-              <a:spcAft>
-                <a:spcPts val="0"/>
-              </a:spcAft>
-              <a:buNone/>
-            </a:pPr>
-            <a:r>
-              <a:rPr lang="ru" sz="1150" b="1" dirty="0"/>
-              <a:t>Опыт:</a:t>
-            </a:r>
-            <a:endParaRPr sz="1150" dirty="0"/>
-          </a:p>
-          <a:p>
-            <a:pPr marL="0" marR="0" lvl="0" indent="0" algn="l" rtl="0">
-              <a:lnSpc>
-                <a:spcPct val="100000"/>
-              </a:lnSpc>
-              <a:spcBef>
-                <a:spcPts val="0"/>
-              </a:spcBef>
-              <a:spcAft>
-                <a:spcPts val="0"/>
-              </a:spcAft>
-              <a:buNone/>
-            </a:pPr>
-            <a:r>
-              <a:rPr lang="ru-RU" sz="1150" dirty="0"/>
-              <a:t>Б</a:t>
-            </a:r>
-            <a:r>
-              <a:rPr lang="ru" sz="1150" dirty="0"/>
-              <a:t>олее 15 лет занимался прикладной математикой и мат моделированием</a:t>
-            </a:r>
-          </a:p>
-          <a:p>
-            <a:pPr marL="0" marR="0" lvl="0" indent="0" algn="l" rtl="0">
-              <a:lnSpc>
-                <a:spcPct val="100000"/>
-              </a:lnSpc>
-              <a:spcBef>
-                <a:spcPts val="0"/>
-              </a:spcBef>
-              <a:spcAft>
-                <a:spcPts val="0"/>
-              </a:spcAft>
-              <a:buNone/>
-            </a:pPr>
-            <a:r>
-              <a:rPr lang="ru" sz="1150" dirty="0"/>
-              <a:t>(Data Scientist) (Python, С++) в НИИ ПАО Газпром</a:t>
-            </a:r>
-            <a:endParaRPr sz="1150" dirty="0"/>
-          </a:p>
-          <a:p>
-            <a:pPr marL="0" marR="0" lvl="0" indent="0" algn="l" rtl="0">
-              <a:lnSpc>
-                <a:spcPct val="100000"/>
-              </a:lnSpc>
-              <a:spcBef>
-                <a:spcPts val="0"/>
-              </a:spcBef>
-              <a:spcAft>
-                <a:spcPts val="0"/>
-              </a:spcAft>
-              <a:buNone/>
-            </a:pPr>
-            <a:endParaRPr sz="1150" dirty="0"/>
-          </a:p>
-          <a:p>
-            <a:pPr marL="0" marR="0" lvl="0" indent="0" algn="l" rtl="0">
-              <a:lnSpc>
-                <a:spcPct val="100000"/>
-              </a:lnSpc>
-              <a:spcBef>
-                <a:spcPts val="0"/>
-              </a:spcBef>
-              <a:spcAft>
-                <a:spcPts val="0"/>
-              </a:spcAft>
-              <a:buNone/>
-            </a:pPr>
-            <a:r>
-              <a:rPr lang="ru" sz="1150" dirty="0"/>
-              <a:t>Анализ временных рядов, эволюционное развитие сложных систем</a:t>
-            </a:r>
-            <a:endParaRPr sz="1150" dirty="0"/>
-          </a:p>
-          <a:p>
-            <a:pPr marL="0" marR="0" lvl="0" indent="0" algn="l" rtl="0">
-              <a:lnSpc>
-                <a:spcPct val="100000"/>
-              </a:lnSpc>
-              <a:spcBef>
-                <a:spcPts val="0"/>
-              </a:spcBef>
-              <a:spcAft>
-                <a:spcPts val="0"/>
-              </a:spcAft>
-              <a:buNone/>
-            </a:pPr>
-            <a:endParaRPr sz="1150" dirty="0"/>
-          </a:p>
-          <a:p>
-            <a:pPr marL="0" marR="0" lvl="0" indent="0" algn="l" rtl="0">
-              <a:lnSpc>
-                <a:spcPct val="100000"/>
-              </a:lnSpc>
-              <a:spcBef>
-                <a:spcPts val="0"/>
-              </a:spcBef>
-              <a:spcAft>
-                <a:spcPts val="0"/>
-              </a:spcAft>
-              <a:buNone/>
-            </a:pPr>
-            <a:r>
-              <a:rPr lang="ru-RU" sz="1150" b="1" dirty="0"/>
-              <a:t>+7 (916) 156-07-82 (</a:t>
-            </a:r>
-            <a:r>
-              <a:rPr lang="en-US" sz="1150" b="1" dirty="0" err="1"/>
-              <a:t>whatsapp</a:t>
-            </a:r>
-            <a:r>
-              <a:rPr lang="en-US" sz="1150" b="1" dirty="0"/>
-              <a:t>)</a:t>
-            </a:r>
-          </a:p>
-          <a:p>
-            <a:pPr marL="0" marR="0" lvl="0" indent="0" algn="l" rtl="0">
-              <a:lnSpc>
-                <a:spcPct val="100000"/>
-              </a:lnSpc>
-              <a:spcBef>
-                <a:spcPts val="0"/>
-              </a:spcBef>
-              <a:spcAft>
-                <a:spcPts val="0"/>
-              </a:spcAft>
-              <a:buNone/>
-            </a:pPr>
-            <a:endParaRPr lang="en-US" sz="1150" b="1" dirty="0"/>
-          </a:p>
-          <a:p>
-            <a:pPr marL="0" marR="0" lvl="0" indent="0" algn="l" rtl="0">
-              <a:lnSpc>
-                <a:spcPct val="100000"/>
-              </a:lnSpc>
-              <a:spcBef>
-                <a:spcPts val="0"/>
-              </a:spcBef>
-              <a:spcAft>
-                <a:spcPts val="0"/>
-              </a:spcAft>
-              <a:buNone/>
-            </a:pPr>
-            <a:r>
-              <a:rPr lang="en-US" sz="1150" b="1" dirty="0"/>
-              <a:t>@</a:t>
-            </a:r>
-            <a:r>
-              <a:rPr lang="en-US" sz="1150" b="1" dirty="0" err="1"/>
-              <a:t>stureiko</a:t>
-            </a:r>
-            <a:r>
-              <a:rPr lang="en-US" sz="1150" b="1" dirty="0"/>
-              <a:t> (TG)</a:t>
-            </a:r>
-            <a:endParaRPr sz="1150" b="1" dirty="0"/>
-          </a:p>
-          <a:p>
-            <a:pPr marL="0" marR="0" lvl="0" indent="0" algn="l" rtl="0">
-              <a:lnSpc>
-                <a:spcPct val="100000"/>
-              </a:lnSpc>
-              <a:spcBef>
-                <a:spcPts val="0"/>
-              </a:spcBef>
-              <a:spcAft>
-                <a:spcPts val="0"/>
-              </a:spcAft>
-              <a:buNone/>
-            </a:pPr>
-            <a:endParaRPr sz="1400" dirty="0"/>
-          </a:p>
-        </p:txBody>
-      </p:sp>
-      <p:sp>
-        <p:nvSpPr>
           <p:cNvPr id="12" name="Google Shape;499;p77">
             <a:extLst>
               <a:ext uri="{FF2B5EF4-FFF2-40B4-BE49-F238E27FC236}">
@@ -15088,18 +14824,14 @@
             </a:pPr>
             <a:r>
               <a:rPr lang="ru-RU" dirty="0"/>
-              <a:t>Приходите на следующие </a:t>
-            </a:r>
-            <a:r>
-              <a:rPr lang="ru-RU" dirty="0" err="1"/>
-              <a:t>вебинары</a:t>
+              <a:t>Приходите на следующие вебинары</a:t>
             </a:r>
             <a:br>
               <a:rPr lang="ru-RU" dirty="0"/>
             </a:br>
             <a:r>
               <a:rPr lang="en-US" sz="1800" dirty="0"/>
-              <a:t>29.11 – </a:t>
+              <a:t>11.09 – </a:t>
             </a:r>
             <a:r>
               <a:rPr lang="ru-RU" sz="1800" dirty="0"/>
@@ -15244,6 +14976,428 @@
           </a:sp3d>
         </p:spPr>
       </p:pic>
+      <p:sp>
+        <p:nvSpPr>
+          <p:cNvPr id="10" name="Google Shape;209;p48">
+            <a:extLst>
+              <a:ext uri="{FF2B5EF4-FFF2-40B4-BE49-F238E27FC236}">
+                <a16:creationId xmlns:a16="http://schemas.microsoft.com/office/drawing/2014/main" id="{DADDA820-7925-7347-9D18-F52F07DDBD69}"/>
+              </a:ext>
+            </a:extLst>
+          </p:cNvPr>
+          <p:cNvSpPr txBox="1">
+            <a:spLocks/>
+          </p:cNvSpPr>
+          <p:nvPr/>
+        </p:nvSpPr>
+        <p:spPr>
+          <a:xfrm>
+            <a:off x="3082400" y="2701811"/>
+            <a:ext cx="5938750" cy="2133660"/>
+          </a:xfrm>
+          <a:prstGeom prst="rect">
+            <a:avLst/>
+          </a:prstGeom>
+          <a:noFill/>
+          <a:ln>
+            <a:noFill/>
+          </a:ln>
+        </p:spPr>
+        <p:txBody>
+          <a:bodyPr spcFirstLastPara="1" wrap="square" lIns="91425" tIns="91425" rIns="91425" bIns="91425" anchor="t" anchorCtr="0">
+            <a:normAutofit fontScale="85000" lnSpcReduction="20000"/>
+          </a:bodyPr>
+          <a:lstStyle>
+            <a:lvl1pPr marL="0" lvl="0" algn="l">
+              <a:lnSpc>
+                <a:spcPct val="100000"/>
+              </a:lnSpc>
+              <a:spcBef>
+                <a:spcPts val="0"/>
+              </a:spcBef>
+              <a:spcAft>
+                <a:spcPts val="0"/>
+              </a:spcAft>
+              <a:buClr>
+                <a:schemeClr val="dk1"/>
+              </a:buClr>
+              <a:buSzPts val="1300"/>
+              <a:buNone/>
+              <a:defRPr sz="1300" b="0" i="0">
+                <a:solidFill>
+                  <a:schemeClr val="dk1"/>
+                </a:solidFill>
+                <a:latin typeface="+mn-lt"/>
+                <a:ea typeface="+mn-ea"/>
+                <a:cs typeface="+mn-cs"/>
+              </a:defRPr>
+            </a:lvl1pPr>
+            <a:lvl2pPr marL="457200" lvl="1" algn="l">
+              <a:lnSpc>
+                <a:spcPct val="100000"/>
+              </a:lnSpc>
+              <a:spcBef>
+                <a:spcPts val="0"/>
+              </a:spcBef>
+              <a:spcAft>
+                <a:spcPts val="0"/>
+              </a:spcAft>
+              <a:buClr>
+                <a:schemeClr val="dk1"/>
+              </a:buClr>
+              <a:buSzPts val="1500"/>
+              <a:buNone/>
+              <a:defRPr>
+                <a:solidFill>
+                  <a:schemeClr val="dk1"/>
+                </a:solidFill>
+                <a:latin typeface="+mn-lt"/>
+                <a:ea typeface="+mn-ea"/>
+                <a:cs typeface="+mn-cs"/>
+              </a:defRPr>
+            </a:lvl2pPr>
+            <a:lvl3pPr marL="914400" lvl="2" algn="l">
+              <a:lnSpc>
+                <a:spcPct val="100000"/>
+              </a:lnSpc>
+              <a:spcBef>
+                <a:spcPts val="0"/>
+              </a:spcBef>
+              <a:spcAft>
+                <a:spcPts val="0"/>
+              </a:spcAft>
+              <a:buClr>
+                <a:schemeClr val="dk1"/>
+              </a:buClr>
+              <a:buSzPts val="1300"/>
+              <a:buNone/>
+              <a:defRPr>
+                <a:solidFill>
+                  <a:schemeClr val="dk1"/>
+                </a:solidFill>
+                <a:latin typeface="+mn-lt"/>
+                <a:ea typeface="+mn-ea"/>
+                <a:cs typeface="+mn-cs"/>
+              </a:defRPr>
+            </a:lvl3pPr>
+            <a:lvl4pPr marL="1371600" lvl="3" algn="l">
+              <a:lnSpc>
+                <a:spcPct val="100000"/>
+              </a:lnSpc>
+              <a:spcBef>
+                <a:spcPts val="0"/>
+              </a:spcBef>
+              <a:spcAft>
+                <a:spcPts val="0"/>
+              </a:spcAft>
+              <a:buClr>
+                <a:schemeClr val="dk1"/>
+              </a:buClr>
+              <a:buSzPts val="1300"/>
+              <a:buNone/>
+              <a:defRPr>
+                <a:solidFill>
+                  <a:schemeClr val="dk1"/>
+                </a:solidFill>
+                <a:latin typeface="+mn-lt"/>
+                <a:ea typeface="+mn-ea"/>
+                <a:cs typeface="+mn-cs"/>
+              </a:defRPr>
+            </a:lvl4pPr>
+            <a:lvl5pPr marL="1828800" lvl="4" algn="l">
+              <a:lnSpc>
+                <a:spcPct val="100000"/>
+              </a:lnSpc>
+              <a:spcBef>
+                <a:spcPts val="0"/>
+              </a:spcBef>
+              <a:spcAft>
+                <a:spcPts val="0"/>
+              </a:spcAft>
+              <a:buClr>
+                <a:schemeClr val="dk1"/>
+              </a:buClr>
+              <a:buSzPts val="1300"/>
+              <a:buNone/>
+              <a:defRPr>
+                <a:solidFill>
+                  <a:schemeClr val="dk1"/>
+                </a:solidFill>
+                <a:latin typeface="+mn-lt"/>
+                <a:ea typeface="+mn-ea"/>
+                <a:cs typeface="+mn-cs"/>
+              </a:defRPr>
+            </a:lvl5pPr>
+            <a:lvl6pPr marL="2286000" lvl="5" algn="l">
+              <a:lnSpc>
+                <a:spcPct val="100000"/>
+              </a:lnSpc>
+              <a:spcBef>
+                <a:spcPts val="0"/>
+              </a:spcBef>
+              <a:spcAft>
+                <a:spcPts val="0"/>
+              </a:spcAft>
+              <a:buClr>
+                <a:schemeClr val="dk1"/>
+              </a:buClr>
+              <a:buSzPts val="1300"/>
+              <a:buNone/>
+              <a:defRPr>
+                <a:solidFill>
+                  <a:schemeClr val="dk1"/>
+                </a:solidFill>
+                <a:latin typeface="+mn-lt"/>
+                <a:ea typeface="+mn-ea"/>
+                <a:cs typeface="+mn-cs"/>
+              </a:defRPr>
+            </a:lvl6pPr>
+            <a:lvl7pPr marL="2743200" lvl="6" algn="l">
+              <a:lnSpc>
+                <a:spcPct val="100000"/>
+              </a:lnSpc>
+              <a:spcBef>
+                <a:spcPts val="0"/>
+              </a:spcBef>
+              <a:spcAft>
+                <a:spcPts val="0"/>
+              </a:spcAft>
+              <a:buClr>
+                <a:schemeClr val="dk1"/>
+              </a:buClr>
+              <a:buSzPts val="1300"/>
+              <a:buNone/>
+              <a:defRPr>
+                <a:solidFill>
+                  <a:schemeClr val="dk1"/>
+                </a:solidFill>
+                <a:latin typeface="+mn-lt"/>
+                <a:ea typeface="+mn-ea"/>
+                <a:cs typeface="+mn-cs"/>
+              </a:defRPr>
+            </a:lvl7pPr>
+            <a:lvl8pPr marL="3200400" lvl="7" algn="l">
+              <a:lnSpc>
+                <a:spcPct val="100000"/>
+              </a:lnSpc>
+              <a:spcBef>
+                <a:spcPts val="0"/>
+              </a:spcBef>
+              <a:spcAft>
+                <a:spcPts val="0"/>
+              </a:spcAft>
+              <a:buClr>
+                <a:schemeClr val="dk1"/>
+              </a:buClr>
+              <a:buSzPts val="1300"/>
+              <a:buNone/>
+              <a:defRPr>
+                <a:solidFill>
+                  <a:schemeClr val="dk1"/>
+                </a:solidFill>
+                <a:latin typeface="+mn-lt"/>
+                <a:ea typeface="+mn-ea"/>
+                <a:cs typeface="+mn-cs"/>
+              </a:defRPr>
+            </a:lvl8pPr>
+            <a:lvl9pPr marL="3657600" lvl="8" algn="l">
+              <a:lnSpc>
+                <a:spcPct val="100000"/>
+              </a:lnSpc>
+              <a:spcBef>
+                <a:spcPts val="0"/>
+              </a:spcBef>
+              <a:spcAft>
+                <a:spcPts val="0"/>
+              </a:spcAft>
+              <a:buClr>
+                <a:schemeClr val="dk1"/>
+              </a:buClr>
+              <a:buSzPts val="1300"/>
+              <a:buNone/>
+              <a:defRPr>
+                <a:solidFill>
+                  <a:schemeClr val="dk1"/>
+                </a:solidFill>
+                <a:latin typeface="+mn-lt"/>
+                <a:ea typeface="+mn-ea"/>
+                <a:cs typeface="+mn-cs"/>
+              </a:defRPr>
+            </a:lvl9pPr>
+          </a:lstStyle>
+          <a:p>
+            <a:pPr marL="1470025" indent="-1465263">
+              <a:tabLst>
+                <a:tab pos="1465263" algn="l"/>
+              </a:tabLst>
+            </a:pPr>
+            <a:r>
+              <a:rPr lang="ru-RU" sz="1150" b="1" kern="0" dirty="0"/>
+              <a:t>Руководитель курсов: </a:t>
+            </a:r>
+            <a:r>
+              <a:rPr lang="en-US" sz="1150" b="1" kern="0" dirty="0"/>
+              <a:t>	Reinforcement Learning, ML Professional, ML Basic, </a:t>
+            </a:r>
+            <a:br>
+              <a:rPr lang="en-US" sz="1150" b="1" kern="0" dirty="0"/>
+            </a:br>
+            <a:r>
+              <a:rPr lang="en-US" sz="1150" b="1" kern="0" dirty="0" err="1"/>
+              <a:t>MLOps</a:t>
+            </a:r>
+            <a:r>
+              <a:rPr lang="en-US" sz="1150" b="1" kern="0" dirty="0"/>
+              <a:t>, </a:t>
+            </a:r>
+            <a:r>
+              <a:rPr lang="en-US" sz="1150" b="1" kern="0" dirty="0" err="1"/>
+              <a:t>FinML</a:t>
+            </a:r>
+            <a:endParaRPr lang="en-US" sz="1150" b="1" kern="0" dirty="0"/>
+          </a:p>
+          <a:p>
+            <a:pPr rtl="0"/>
+            <a:endParaRPr lang="en-US" sz="1150" b="1" kern="0" dirty="0"/>
+          </a:p>
+          <a:p>
+            <a:pPr rtl="0"/>
+            <a:r>
+              <a:rPr lang="en-US" sz="1150" b="1" kern="0" dirty="0" err="1"/>
+              <a:t>Teamlead</a:t>
+            </a:r>
+            <a:r>
+              <a:rPr lang="en-US" sz="1150" b="1" kern="0" dirty="0"/>
+              <a:t>, </a:t>
+            </a:r>
+            <a:r>
+              <a:rPr lang="ru-RU" sz="1150" b="1" kern="0" dirty="0"/>
+              <a:t>главный инженер проекта, </a:t>
+            </a:r>
+          </a:p>
+          <a:p>
+            <a:pPr rtl="0"/>
+            <a:r>
+              <a:rPr lang="ru-RU" sz="1150" b="1" kern="0" dirty="0"/>
+              <a:t>Физический факультет МГУ, </a:t>
+            </a:r>
+            <a:r>
+              <a:rPr lang="en-US" sz="1150" b="1" kern="0" dirty="0"/>
+              <a:t>PhD </a:t>
+            </a:r>
+            <a:r>
+              <a:rPr lang="ru-RU" sz="1150" b="1" kern="0" dirty="0"/>
+              <a:t>теоретическая физика</a:t>
+            </a:r>
+          </a:p>
+          <a:p>
+            <a:pPr rtl="0"/>
+            <a:endParaRPr lang="ru-RU" sz="1150" kern="0" dirty="0"/>
+          </a:p>
+          <a:p>
+            <a:pPr rtl="0"/>
+            <a:r>
+              <a:rPr lang="ru-RU" sz="1150" b="1" kern="0" dirty="0"/>
+              <a:t>Опыт:</a:t>
+            </a:r>
+            <a:endParaRPr lang="ru-RU" sz="1150" kern="0" dirty="0"/>
+          </a:p>
+          <a:p>
+            <a:pPr rtl="0"/>
+            <a:r>
+              <a:rPr lang="ru-RU" sz="1150" kern="0" dirty="0"/>
+              <a:t>Более 15 лет занимался прикладной математикой и мат моделированием</a:t>
+            </a:r>
+          </a:p>
+          <a:p>
+            <a:pPr rtl="0"/>
+            <a:r>
+              <a:rPr lang="ru-RU" sz="1150" kern="0" dirty="0"/>
+              <a:t>(</a:t>
+            </a:r>
+            <a:r>
+              <a:rPr lang="en-US" sz="1150" kern="0" dirty="0"/>
+              <a:t>Data Scientist) (Python, </a:t>
+            </a:r>
+            <a:r>
+              <a:rPr lang="ru-RU" sz="1150" kern="0" dirty="0"/>
+              <a:t>С++) в НИИ ПАО Газпром</a:t>
+            </a:r>
+          </a:p>
+          <a:p>
+            <a:pPr rtl="0"/>
+            <a:endParaRPr lang="ru-RU" sz="1150" kern="0" dirty="0"/>
+          </a:p>
+          <a:p>
+            <a:pPr rtl="0"/>
+            <a:endParaRPr lang="ru-RU" sz="1150" b="1" kern="0" dirty="0"/>
+          </a:p>
+          <a:p>
+            <a:pPr rtl="0"/>
+            <a:r>
+              <a:rPr lang="ru-RU" sz="1150" b="1" kern="0" dirty="0"/>
+              <a:t>@</a:t>
+            </a:r>
+            <a:r>
+              <a:rPr lang="en-US" sz="1150" b="1" kern="0" dirty="0" err="1"/>
+              <a:t>stureiko</a:t>
+            </a:r>
+            <a:r>
+              <a:rPr lang="en-US" sz="1150" b="1" kern="0" dirty="0"/>
+              <a:t> (TG)</a:t>
+            </a:r>
+          </a:p>
+          <a:p>
+            <a:pPr rtl="0"/>
+            <a:endParaRPr lang="en-US" sz="1150" b="1" kern="0" dirty="0"/>
+          </a:p>
+          <a:p>
+            <a:pPr rtl="0"/>
+            <a:r>
+              <a:rPr lang="en-US" sz="1150" b="1" kern="0" dirty="0"/>
+              <a:t>LinkedIn: </a:t>
+            </a:r>
+            <a:r>
+              <a:rPr lang="en-US" sz="1150" kern="0" dirty="0">
+                <a:hlinkClick r:id="rId4"/>
+              </a:rPr>
+              <a:t>igor-stureiko</a:t>
+            </a:r>
+            <a:r>
+              <a:rPr lang="en-US" sz="1150" kern="0" dirty="0"/>
+              <a:t> </a:t>
+            </a:r>
+          </a:p>
+          <a:p>
+            <a:pPr rtl="0"/>
+            <a:endParaRPr lang="en-US" sz="1150" kern="0" dirty="0"/>
+          </a:p>
+          <a:p>
+            <a:pPr rtl="0"/>
+            <a:r>
+              <a:rPr lang="en-US" sz="1150" b="1" kern="0" dirty="0"/>
+              <a:t>@</a:t>
+            </a:r>
+            <a:r>
+              <a:rPr lang="en-US" sz="1150" b="1" kern="0" dirty="0" err="1"/>
+              <a:t>rl_fintech</a:t>
+            </a:r>
+            <a:r>
+              <a:rPr lang="en-US" sz="1150" b="1" kern="0" dirty="0"/>
+              <a:t> </a:t>
+            </a:r>
+            <a:r>
+              <a:rPr lang="en-US" sz="1150" kern="0" dirty="0"/>
+              <a:t>(</a:t>
+            </a:r>
+            <a:r>
+              <a:rPr lang="ru-RU" sz="1150" kern="0" dirty="0"/>
+              <a:t>Мой канал о моделях в бизнесе)</a:t>
+            </a:r>
+            <a:endParaRPr lang="ru-RU" sz="1400" kern="0" dirty="0"/>
+          </a:p>
+        </p:txBody>
+      </p:sp>
     </p:spTree>
     <p:extLst>
       <p:ext uri="{BB962C8B-B14F-4D97-AF65-F5344CB8AC3E}">
@@ -15481,270 +15635,6 @@
               <a:t>Игорь Стурейко</a:t>
             </a:r>
             <a:endParaRPr dirty="0"/>
-          </a:p>
-        </p:txBody>
-      </p:sp>
-      <p:sp>
-        <p:nvSpPr>
-          <p:cNvPr id="209" name="Google Shape;209;p48"/>
-          <p:cNvSpPr txBox="1">
-            <a:spLocks noGrp="1"/>
-          </p:cNvSpPr>
-          <p:nvPr>
-            <p:ph type="subTitle" idx="3"/>
-          </p:nvPr>
-        </p:nvSpPr>
-        <p:spPr>
-          <a:xfrm>
-            <a:off x="3082400" y="2701811"/>
-            <a:ext cx="5095500" cy="1984839"/>
-          </a:xfrm>
-          <a:prstGeom prst="rect">
-            <a:avLst/>
-          </a:prstGeom>
-        </p:spPr>
-        <p:txBody>
-          <a:bodyPr spcFirstLastPara="1" wrap="square" lIns="91425" tIns="91425" rIns="91425" bIns="91425" anchor="t" anchorCtr="0">
-            <a:normAutofit fontScale="92500" lnSpcReduction="10000"/>
-          </a:bodyPr>
-          <a:lstStyle/>
-          <a:p>
-            <a:pPr marL="0" marR="0" lvl="0" indent="0" algn="l" rtl="0">
-              <a:lnSpc>
-                <a:spcPct val="100000"/>
-              </a:lnSpc>
-              <a:spcBef>
-                <a:spcPts val="0"/>
-              </a:spcBef>
-              <a:spcAft>
-                <a:spcPts val="0"/>
-              </a:spcAft>
-              <a:buNone/>
-            </a:pPr>
-            <a:r>
-              <a:rPr lang="en-US" sz="1150" b="1" dirty="0" err="1"/>
-              <a:t>Teamlead</a:t>
-            </a:r>
-            <a:r>
-              <a:rPr lang="ru-RU" sz="1150" b="1" dirty="0"/>
-              <a:t>, главный инженер проекта –</a:t>
-            </a:r>
-            <a:r>
-              <a:rPr lang="en-US" sz="1150" b="1" dirty="0"/>
-              <a:t> </a:t>
-            </a:r>
-            <a:r>
-              <a:rPr lang="ru-RU" sz="1150" b="1" dirty="0" err="1"/>
-              <a:t>НИИгазэкономика</a:t>
-            </a:r>
-            <a:endParaRPr sz="1150" b="1" dirty="0"/>
-          </a:p>
-          <a:p>
-            <a:pPr marL="0" marR="0" lvl="0" indent="0" algn="l" rtl="0">
-              <a:lnSpc>
-                <a:spcPct val="100000"/>
-              </a:lnSpc>
-              <a:spcBef>
-                <a:spcPts val="0"/>
-              </a:spcBef>
-              <a:spcAft>
-                <a:spcPts val="0"/>
-              </a:spcAft>
-              <a:buNone/>
-            </a:pPr>
-            <a:endParaRPr sz="1150" dirty="0"/>
-          </a:p>
-          <a:p>
-            <a:pPr marL="0" marR="0" lvl="0" indent="0" algn="l" rtl="0">
-              <a:lnSpc>
-                <a:spcPct val="100000"/>
-              </a:lnSpc>
-              <a:spcBef>
-                <a:spcPts val="0"/>
-              </a:spcBef>
-              <a:spcAft>
-                <a:spcPts val="0"/>
-              </a:spcAft>
-              <a:buNone/>
-            </a:pPr>
-            <a:r>
-              <a:rPr lang="ru" sz="1150" b="1" dirty="0"/>
-              <a:t>Опыт:</a:t>
-            </a:r>
-            <a:endParaRPr sz="1150" dirty="0"/>
-          </a:p>
-          <a:p>
-            <a:pPr marL="0" marR="0" lvl="0" indent="0" algn="l" rtl="0">
-              <a:lnSpc>
-                <a:spcPct val="100000"/>
-              </a:lnSpc>
-              <a:spcBef>
-                <a:spcPts val="0"/>
-              </a:spcBef>
-              <a:spcAft>
-                <a:spcPts val="0"/>
-              </a:spcAft>
-              <a:buNone/>
-            </a:pPr>
-            <a:r>
-              <a:rPr lang="ru-RU" sz="1150" dirty="0"/>
-              <a:t>Б</a:t>
-            </a:r>
-            <a:r>
-              <a:rPr lang="ru" sz="1150" dirty="0"/>
-              <a:t>олее 15 лет занимался прикладной математикой и мат моделированием</a:t>
-            </a:r>
-          </a:p>
-          <a:p>
-            <a:pPr marL="0" marR="0" lvl="0" indent="0" algn="l" rtl="0">
-              <a:lnSpc>
-                <a:spcPct val="100000"/>
-              </a:lnSpc>
-              <a:spcBef>
-                <a:spcPts val="0"/>
-              </a:spcBef>
-              <a:spcAft>
-                <a:spcPts val="0"/>
-              </a:spcAft>
-              <a:buNone/>
-            </a:pPr>
-            <a:r>
-              <a:rPr lang="ru" sz="1150" dirty="0"/>
-              <a:t>(Data Scientist) (Python, С++) в НИИ ПАО Газпром</a:t>
-            </a:r>
-            <a:endParaRPr sz="1150" dirty="0"/>
-          </a:p>
-          <a:p>
-            <a:pPr marL="0" marR="0" lvl="0" indent="0" algn="l" rtl="0">
-              <a:lnSpc>
-                <a:spcPct val="100000"/>
-              </a:lnSpc>
-              <a:spcBef>
-                <a:spcPts val="0"/>
-              </a:spcBef>
-              <a:spcAft>
-                <a:spcPts val="0"/>
-              </a:spcAft>
-              <a:buNone/>
-            </a:pPr>
-            <a:endParaRPr sz="1150" dirty="0"/>
-          </a:p>
-          <a:p>
-            <a:pPr marL="0" marR="0" lvl="0" indent="0" algn="l" rtl="0">
-              <a:lnSpc>
-                <a:spcPct val="100000"/>
-              </a:lnSpc>
-              <a:spcBef>
-                <a:spcPts val="0"/>
-              </a:spcBef>
-              <a:spcAft>
-                <a:spcPts val="0"/>
-              </a:spcAft>
-              <a:buNone/>
-            </a:pPr>
-            <a:r>
-              <a:rPr lang="ru" sz="1150" dirty="0"/>
-              <a:t>Анализ временных рядов, эволюционное развитие сложных систем</a:t>
-            </a:r>
-            <a:endParaRPr sz="1150" dirty="0"/>
-          </a:p>
-          <a:p>
-            <a:pPr marL="0" marR="0" lvl="0" indent="0" algn="l" rtl="0">
-              <a:lnSpc>
-                <a:spcPct val="100000"/>
-              </a:lnSpc>
-              <a:spcBef>
-                <a:spcPts val="0"/>
-              </a:spcBef>
-              <a:spcAft>
-                <a:spcPts val="0"/>
-              </a:spcAft>
-              <a:buNone/>
-            </a:pPr>
-            <a:endParaRPr sz="1150" dirty="0"/>
-          </a:p>
-          <a:p>
-            <a:pPr marL="0" marR="0" lvl="0" indent="0" algn="l" rtl="0">
-              <a:lnSpc>
-                <a:spcPct val="100000"/>
-              </a:lnSpc>
-              <a:spcBef>
-                <a:spcPts val="0"/>
-              </a:spcBef>
-              <a:spcAft>
-                <a:spcPts val="0"/>
-              </a:spcAft>
-              <a:buNone/>
-            </a:pPr>
-            <a:r>
-              <a:rPr lang="ru-RU" sz="1150" b="1" dirty="0"/>
-              <a:t>+7 (916) 156-07-82 (</a:t>
-            </a:r>
-            <a:r>
-              <a:rPr lang="en-US" sz="1150" b="1" dirty="0" err="1"/>
-              <a:t>whatsapp</a:t>
-            </a:r>
-            <a:r>
-              <a:rPr lang="en-US" sz="1150" b="1" dirty="0"/>
-              <a:t>)</a:t>
-            </a:r>
-          </a:p>
-          <a:p>
-            <a:pPr marL="0" marR="0" lvl="0" indent="0" algn="l" rtl="0">
-              <a:lnSpc>
-                <a:spcPct val="100000"/>
-              </a:lnSpc>
-              <a:spcBef>
-                <a:spcPts val="0"/>
-              </a:spcBef>
-              <a:spcAft>
-                <a:spcPts val="0"/>
-              </a:spcAft>
-              <a:buNone/>
-            </a:pPr>
-            <a:endParaRPr lang="en-US" sz="1150" b="1" dirty="0"/>
-          </a:p>
-          <a:p>
-            <a:pPr marL="0" marR="0" lvl="0" indent="0" algn="l" rtl="0">
-              <a:lnSpc>
-                <a:spcPct val="100000"/>
-              </a:lnSpc>
-              <a:spcBef>
-                <a:spcPts val="0"/>
-              </a:spcBef>
-              <a:spcAft>
-                <a:spcPts val="0"/>
-              </a:spcAft>
-              <a:buNone/>
-            </a:pPr>
-            <a:r>
-              <a:rPr lang="en-US" sz="1150" b="1" dirty="0"/>
-              <a:t>@</a:t>
-            </a:r>
-            <a:r>
-              <a:rPr lang="en-US" sz="1150" b="1" dirty="0" err="1"/>
-              <a:t>stureiko</a:t>
-            </a:r>
-            <a:r>
-              <a:rPr lang="en-US" sz="1150" b="1" dirty="0"/>
-              <a:t> (TG)</a:t>
-            </a:r>
-            <a:endParaRPr sz="1150" b="1" dirty="0"/>
-          </a:p>
-          <a:p>
-            <a:pPr marL="0" marR="0" lvl="0" indent="0" algn="l" rtl="0">
-              <a:lnSpc>
-                <a:spcPct val="100000"/>
-              </a:lnSpc>
-              <a:spcBef>
-                <a:spcPts val="0"/>
-              </a:spcBef>
-              <a:spcAft>
-                <a:spcPts val="0"/>
-              </a:spcAft>
-              <a:buNone/>
-            </a:pPr>
-            <a:endParaRPr sz="1400" dirty="0"/>
           </a:p>
         </p:txBody>
       </p:sp>
@@ -15807,6 +15697,428 @@
           </a:sp3d>
         </p:spPr>
       </p:pic>
+      <p:sp>
+        <p:nvSpPr>
+          <p:cNvPr id="10" name="Google Shape;209;p48">
+            <a:extLst>
+              <a:ext uri="{FF2B5EF4-FFF2-40B4-BE49-F238E27FC236}">
+                <a16:creationId xmlns:a16="http://schemas.microsoft.com/office/drawing/2014/main" id="{84F72DE5-B9BB-374F-994F-599AA90D4AE7}"/>
+              </a:ext>
+            </a:extLst>
+          </p:cNvPr>
+          <p:cNvSpPr txBox="1">
+            <a:spLocks/>
+          </p:cNvSpPr>
+          <p:nvPr/>
+        </p:nvSpPr>
+        <p:spPr>
+          <a:xfrm>
+            <a:off x="3082400" y="2701811"/>
+            <a:ext cx="5938750" cy="2133660"/>
+          </a:xfrm>
+          <a:prstGeom prst="rect">
+            <a:avLst/>
+          </a:prstGeom>
+          <a:noFill/>
+          <a:ln>
+            <a:noFill/>
+          </a:ln>
+        </p:spPr>
+        <p:txBody>
+          <a:bodyPr spcFirstLastPara="1" wrap="square" lIns="91425" tIns="91425" rIns="91425" bIns="91425" anchor="t" anchorCtr="0">
+            <a:normAutofit fontScale="85000" lnSpcReduction="20000"/>
+          </a:bodyPr>
+          <a:lstStyle>
+            <a:lvl1pPr marL="0" lvl="0" algn="l">
+              <a:lnSpc>
+                <a:spcPct val="100000"/>
+              </a:lnSpc>
+              <a:spcBef>
+                <a:spcPts val="0"/>
+              </a:spcBef>
+              <a:spcAft>
+                <a:spcPts val="0"/>
+              </a:spcAft>
+              <a:buClr>
+                <a:schemeClr val="dk1"/>
+              </a:buClr>
+              <a:buSzPts val="1300"/>
+              <a:buNone/>
+              <a:defRPr sz="1300" b="0" i="0">
+                <a:solidFill>
+                  <a:schemeClr val="dk1"/>
+                </a:solidFill>
+                <a:latin typeface="+mn-lt"/>
+                <a:ea typeface="+mn-ea"/>
+                <a:cs typeface="+mn-cs"/>
+              </a:defRPr>
+            </a:lvl1pPr>
+            <a:lvl2pPr marL="457200" lvl="1" algn="l">
+              <a:lnSpc>
+                <a:spcPct val="100000"/>
+              </a:lnSpc>
+              <a:spcBef>
+                <a:spcPts val="0"/>
+              </a:spcBef>
+              <a:spcAft>
+                <a:spcPts val="0"/>
+              </a:spcAft>
+              <a:buClr>
+                <a:schemeClr val="dk1"/>
+              </a:buClr>
+              <a:buSzPts val="1500"/>
+              <a:buNone/>
+              <a:defRPr>
+                <a:solidFill>
+                  <a:schemeClr val="dk1"/>
+                </a:solidFill>
+                <a:latin typeface="+mn-lt"/>
+                <a:ea typeface="+mn-ea"/>
+                <a:cs typeface="+mn-cs"/>
+              </a:defRPr>
+            </a:lvl2pPr>
+            <a:lvl3pPr marL="914400" lvl="2" algn="l">
+              <a:lnSpc>
+                <a:spcPct val="100000"/>
+              </a:lnSpc>
+              <a:spcBef>
+                <a:spcPts val="0"/>
+              </a:spcBef>
+              <a:spcAft>
+                <a:spcPts val="0"/>
+              </a:spcAft>
+              <a:buClr>
+                <a:schemeClr val="dk1"/>
+              </a:buClr>
+              <a:buSzPts val="1300"/>
+              <a:buNone/>
+              <a:defRPr>
+                <a:solidFill>
+                  <a:schemeClr val="dk1"/>
+                </a:solidFill>
+                <a:latin typeface="+mn-lt"/>
+                <a:ea typeface="+mn-ea"/>
+                <a:cs typeface="+mn-cs"/>
+              </a:defRPr>
+            </a:lvl3pPr>
+            <a:lvl4pPr marL="1371600" lvl="3" algn="l">
+              <a:lnSpc>
+                <a:spcPct val="100000"/>
+              </a:lnSpc>
+              <a:spcBef>
+                <a:spcPts val="0"/>
+              </a:spcBef>
+              <a:spcAft>
+                <a:spcPts val="0"/>
+              </a:spcAft>
+              <a:buClr>
+                <a:schemeClr val="dk1"/>
+              </a:buClr>
+              <a:buSzPts val="1300"/>
+              <a:buNone/>
+              <a:defRPr>
+                <a:solidFill>
+                  <a:schemeClr val="dk1"/>
+                </a:solidFill>
+                <a:latin typeface="+mn-lt"/>
+                <a:ea typeface="+mn-ea"/>
+                <a:cs typeface="+mn-cs"/>
+              </a:defRPr>
+            </a:lvl4pPr>
+            <a:lvl5pPr marL="1828800" lvl="4" algn="l">
+              <a:lnSpc>
+                <a:spcPct val="100000"/>
+              </a:lnSpc>
+              <a:spcBef>
+                <a:spcPts val="0"/>
+              </a:spcBef>
+              <a:spcAft>
+                <a:spcPts val="0"/>
+              </a:spcAft>
+              <a:buClr>
+                <a:schemeClr val="dk1"/>
+              </a:buClr>
+              <a:buSzPts val="1300"/>
+              <a:buNone/>
+              <a:defRPr>
+                <a:solidFill>
+                  <a:schemeClr val="dk1"/>
+                </a:solidFill>
+                <a:latin typeface="+mn-lt"/>
+                <a:ea typeface="+mn-ea"/>
+                <a:cs typeface="+mn-cs"/>
+              </a:defRPr>
+            </a:lvl5pPr>
+            <a:lvl6pPr marL="2286000" lvl="5" algn="l">
+              <a:lnSpc>
+                <a:spcPct val="100000"/>
+              </a:lnSpc>
+              <a:spcBef>
+                <a:spcPts val="0"/>
+              </a:spcBef>
+              <a:spcAft>
+                <a:spcPts val="0"/>
+              </a:spcAft>
+              <a:buClr>
+                <a:schemeClr val="dk1"/>
+              </a:buClr>
+              <a:buSzPts val="1300"/>
+              <a:buNone/>
+              <a:defRPr>
+                <a:solidFill>
+                  <a:schemeClr val="dk1"/>
+                </a:solidFill>
+                <a:latin typeface="+mn-lt"/>
+                <a:ea typeface="+mn-ea"/>
+                <a:cs typeface="+mn-cs"/>
+              </a:defRPr>
+            </a:lvl6pPr>
+            <a:lvl7pPr marL="2743200" lvl="6" algn="l">
+              <a:lnSpc>
+                <a:spcPct val="100000"/>
+              </a:lnSpc>
+              <a:spcBef>
+                <a:spcPts val="0"/>
+              </a:spcBef>
+              <a:spcAft>
+                <a:spcPts val="0"/>
+              </a:spcAft>
+              <a:buClr>
+                <a:schemeClr val="dk1"/>
+              </a:buClr>
+              <a:buSzPts val="1300"/>
+              <a:buNone/>
+              <a:defRPr>
+                <a:solidFill>
+                  <a:schemeClr val="dk1"/>
+                </a:solidFill>
+                <a:latin typeface="+mn-lt"/>
+                <a:ea typeface="+mn-ea"/>
+                <a:cs typeface="+mn-cs"/>
+              </a:defRPr>
+            </a:lvl7pPr>
+            <a:lvl8pPr marL="3200400" lvl="7" algn="l">
+              <a:lnSpc>
+                <a:spcPct val="100000"/>
+              </a:lnSpc>
+              <a:spcBef>
+                <a:spcPts val="0"/>
+              </a:spcBef>
+              <a:spcAft>
+                <a:spcPts val="0"/>
+              </a:spcAft>
+              <a:buClr>
+                <a:schemeClr val="dk1"/>
+              </a:buClr>
+              <a:buSzPts val="1300"/>
+              <a:buNone/>
+              <a:defRPr>
+                <a:solidFill>
+                  <a:schemeClr val="dk1"/>
+                </a:solidFill>
+                <a:latin typeface="+mn-lt"/>
+                <a:ea typeface="+mn-ea"/>
+                <a:cs typeface="+mn-cs"/>
+              </a:defRPr>
+            </a:lvl8pPr>
+            <a:lvl9pPr marL="3657600" lvl="8" algn="l">
+              <a:lnSpc>
+                <a:spcPct val="100000"/>
+              </a:lnSpc>
+              <a:spcBef>
+                <a:spcPts val="0"/>
+              </a:spcBef>
+              <a:spcAft>
+                <a:spcPts val="0"/>
+              </a:spcAft>
+              <a:buClr>
+                <a:schemeClr val="dk1"/>
+              </a:buClr>
+              <a:buSzPts val="1300"/>
+              <a:buNone/>
+              <a:defRPr>
+                <a:solidFill>
+                  <a:schemeClr val="dk1"/>
+                </a:solidFill>
+                <a:latin typeface="+mn-lt"/>
+                <a:ea typeface="+mn-ea"/>
+                <a:cs typeface="+mn-cs"/>
+              </a:defRPr>
+            </a:lvl9pPr>
+          </a:lstStyle>
+          <a:p>
+            <a:pPr marL="1470025" indent="-1465263">
+              <a:tabLst>
+                <a:tab pos="1465263" algn="l"/>
+              </a:tabLst>
+            </a:pPr>
+            <a:r>
+              <a:rPr lang="ru-RU" sz="1150" b="1" kern="0" dirty="0"/>
+              <a:t>Руководитель курсов: </a:t>
+            </a:r>
+            <a:r>
+              <a:rPr lang="en-US" sz="1150" b="1" kern="0" dirty="0"/>
+              <a:t>	Reinforcement Learning, ML Professional, ML Basic, </a:t>
+            </a:r>
+            <a:br>
+              <a:rPr lang="en-US" sz="1150" b="1" kern="0" dirty="0"/>
+            </a:br>
+            <a:r>
+              <a:rPr lang="en-US" sz="1150" b="1" kern="0" dirty="0" err="1"/>
+              <a:t>MLOps</a:t>
+            </a:r>
+            <a:r>
+              <a:rPr lang="en-US" sz="1150" b="1" kern="0" dirty="0"/>
+              <a:t>, </a:t>
+            </a:r>
+            <a:r>
+              <a:rPr lang="en-US" sz="1150" b="1" kern="0" dirty="0" err="1"/>
+              <a:t>FinML</a:t>
+            </a:r>
+            <a:endParaRPr lang="en-US" sz="1150" b="1" kern="0" dirty="0"/>
+          </a:p>
+          <a:p>
+            <a:pPr rtl="0"/>
+            <a:endParaRPr lang="en-US" sz="1150" b="1" kern="0" dirty="0"/>
+          </a:p>
+          <a:p>
+            <a:pPr rtl="0"/>
+            <a:r>
+              <a:rPr lang="en-US" sz="1150" b="1" kern="0" dirty="0" err="1"/>
+              <a:t>Teamlead</a:t>
+            </a:r>
+            <a:r>
+              <a:rPr lang="en-US" sz="1150" b="1" kern="0" dirty="0"/>
+              <a:t>, </a:t>
+            </a:r>
+            <a:r>
+              <a:rPr lang="ru-RU" sz="1150" b="1" kern="0" dirty="0"/>
+              <a:t>главный инженер проекта, </a:t>
+            </a:r>
+          </a:p>
+          <a:p>
+            <a:pPr rtl="0"/>
+            <a:r>
+              <a:rPr lang="ru-RU" sz="1150" b="1" kern="0" dirty="0"/>
+              <a:t>Физический факультет МГУ, </a:t>
+            </a:r>
+            <a:r>
+              <a:rPr lang="en-US" sz="1150" b="1" kern="0" dirty="0"/>
+              <a:t>PhD </a:t>
+            </a:r>
+            <a:r>
+              <a:rPr lang="ru-RU" sz="1150" b="1" kern="0" dirty="0"/>
+              <a:t>теоретическая физика</a:t>
+            </a:r>
+          </a:p>
+          <a:p>
+            <a:pPr rtl="0"/>
+            <a:endParaRPr lang="ru-RU" sz="1150" kern="0" dirty="0"/>
+          </a:p>
+          <a:p>
+            <a:pPr rtl="0"/>
+            <a:r>
+              <a:rPr lang="ru-RU" sz="1150" b="1" kern="0" dirty="0"/>
+              <a:t>Опыт:</a:t>
+            </a:r>
+            <a:endParaRPr lang="ru-RU" sz="1150" kern="0" dirty="0"/>
+          </a:p>
+          <a:p>
+            <a:pPr rtl="0"/>
+            <a:r>
+              <a:rPr lang="ru-RU" sz="1150" kern="0" dirty="0"/>
+              <a:t>Более 15 лет занимался прикладной математикой и мат моделированием</a:t>
+            </a:r>
+          </a:p>
+          <a:p>
+            <a:pPr rtl="0"/>
+            <a:r>
+              <a:rPr lang="ru-RU" sz="1150" kern="0" dirty="0"/>
+              <a:t>(</a:t>
+            </a:r>
+            <a:r>
+              <a:rPr lang="en-US" sz="1150" kern="0" dirty="0"/>
+              <a:t>Data Scientist) (Python, </a:t>
+            </a:r>
+            <a:r>
+              <a:rPr lang="ru-RU" sz="1150" kern="0" dirty="0"/>
+              <a:t>С++) в НИИ ПАО Газпром</a:t>
+            </a:r>
+          </a:p>
+          <a:p>
+            <a:pPr rtl="0"/>
+            <a:endParaRPr lang="ru-RU" sz="1150" kern="0" dirty="0"/>
+          </a:p>
+          <a:p>
+            <a:pPr rtl="0"/>
+            <a:endParaRPr lang="ru-RU" sz="1150" b="1" kern="0" dirty="0"/>
+          </a:p>
+          <a:p>
+            <a:pPr rtl="0"/>
+            <a:r>
+              <a:rPr lang="ru-RU" sz="1150" b="1" kern="0" dirty="0"/>
+              <a:t>@</a:t>
+            </a:r>
+            <a:r>
+              <a:rPr lang="en-US" sz="1150" b="1" kern="0" dirty="0" err="1"/>
+              <a:t>stureiko</a:t>
+            </a:r>
+            <a:r>
+              <a:rPr lang="en-US" sz="1150" b="1" kern="0" dirty="0"/>
+              <a:t> (TG)</a:t>
+            </a:r>
+          </a:p>
+          <a:p>
+            <a:pPr rtl="0"/>
+            <a:endParaRPr lang="en-US" sz="1150" b="1" kern="0" dirty="0"/>
+          </a:p>
+          <a:p>
+            <a:pPr rtl="0"/>
+            <a:r>
+              <a:rPr lang="en-US" sz="1150" b="1" kern="0" dirty="0"/>
+              <a:t>LinkedIn: </a:t>
+            </a:r>
+            <a:r>
+              <a:rPr lang="en-US" sz="1150" kern="0" dirty="0">
+                <a:hlinkClick r:id="rId4"/>
+              </a:rPr>
+              <a:t>igor-stureiko</a:t>
+            </a:r>
+            <a:r>
+              <a:rPr lang="en-US" sz="1150" kern="0" dirty="0"/>
+              <a:t> </a:t>
+            </a:r>
+          </a:p>
+          <a:p>
+            <a:pPr rtl="0"/>
+            <a:endParaRPr lang="en-US" sz="1150" kern="0" dirty="0"/>
+          </a:p>
+          <a:p>
+            <a:pPr rtl="0"/>
+            <a:r>
+              <a:rPr lang="en-US" sz="1150" b="1" kern="0" dirty="0"/>
+              <a:t>@</a:t>
+            </a:r>
+            <a:r>
+              <a:rPr lang="en-US" sz="1150" b="1" kern="0" dirty="0" err="1"/>
+              <a:t>rl_fintech</a:t>
+            </a:r>
+            <a:r>
+              <a:rPr lang="en-US" sz="1150" b="1" kern="0" dirty="0"/>
+              <a:t> </a:t>
+            </a:r>
+            <a:r>
+              <a:rPr lang="en-US" sz="1150" kern="0" dirty="0"/>
+              <a:t>(</a:t>
+            </a:r>
+            <a:r>
+              <a:rPr lang="ru-RU" sz="1150" kern="0" dirty="0"/>
+              <a:t>Мой канал о моделях в бизнесе)</a:t>
+            </a:r>
+            <a:endParaRPr lang="ru-RU" sz="1400" kern="0" dirty="0"/>
+          </a:p>
+        </p:txBody>
+      </p:sp>
     </p:spTree>
   </p:cSld>
   <p:clrMapOvr>

</xml_diff>